<commit_message>
Update COD-Private subproject commit
</commit_message>
<xml_diff>
--- a/HTTP Request Smuggling - Group 1.pptx
+++ b/HTTP Request Smuggling - Group 1.pptx
@@ -295,6 +295,50 @@
     <p1510:client id="{1C64898D-F143-4D1E-A71D-F211AC1656E5}" v="48" dt="2023-12-21T03:16:52.723"/>
   </p1510:revLst>
 </p1510:revInfo>
+</file>
+
+<file path=ppt/changesInfos/changesInfo1.xml><?xml version="1.0" encoding="utf-8"?>
+<pc:chgInfo xmlns:a="http://schemas.openxmlformats.org/drawingml/2006/main" xmlns:r="http://schemas.openxmlformats.org/officeDocument/2006/relationships" xmlns:ac="http://schemas.microsoft.com/office/drawing/2013/main/command" xmlns:pc="http://schemas.microsoft.com/office/powerpoint/2013/main/command">
+  <pc:docChgLst>
+    <pc:chgData name="FRANCESCO VECCHIO" userId="4db64fb8-01ef-41c5-8df1-b257e452db65" providerId="ADAL" clId="{73C28F58-6C43-4BD8-BE5B-C69D28A3600E}"/>
+    <pc:docChg chg="modSld">
+      <pc:chgData name="FRANCESCO VECCHIO" userId="4db64fb8-01ef-41c5-8df1-b257e452db65" providerId="ADAL" clId="{73C28F58-6C43-4BD8-BE5B-C69D28A3600E}" dt="2023-12-21T03:33:26.702" v="4" actId="1076"/>
+      <pc:docMkLst>
+        <pc:docMk/>
+      </pc:docMkLst>
+      <pc:sldChg chg="modSp mod">
+        <pc:chgData name="FRANCESCO VECCHIO" userId="4db64fb8-01ef-41c5-8df1-b257e452db65" providerId="ADAL" clId="{73C28F58-6C43-4BD8-BE5B-C69D28A3600E}" dt="2023-12-21T03:33:17.713" v="3" actId="1076"/>
+        <pc:sldMkLst>
+          <pc:docMk/>
+          <pc:sldMk cId="0" sldId="258"/>
+        </pc:sldMkLst>
+        <pc:picChg chg="mod ord">
+          <ac:chgData name="FRANCESCO VECCHIO" userId="4db64fb8-01ef-41c5-8df1-b257e452db65" providerId="ADAL" clId="{73C28F58-6C43-4BD8-BE5B-C69D28A3600E}" dt="2023-12-21T03:33:17.713" v="3" actId="1076"/>
+          <ac:picMkLst>
+            <pc:docMk/>
+            <pc:sldMk cId="0" sldId="258"/>
+            <ac:picMk id="124" creationId="{00000000-0000-0000-0000-000000000000}"/>
+          </ac:picMkLst>
+        </pc:picChg>
+      </pc:sldChg>
+      <pc:sldChg chg="modSp mod">
+        <pc:chgData name="FRANCESCO VECCHIO" userId="4db64fb8-01ef-41c5-8df1-b257e452db65" providerId="ADAL" clId="{73C28F58-6C43-4BD8-BE5B-C69D28A3600E}" dt="2023-12-21T03:33:26.702" v="4" actId="1076"/>
+        <pc:sldMkLst>
+          <pc:docMk/>
+          <pc:sldMk cId="0" sldId="259"/>
+        </pc:sldMkLst>
+        <pc:picChg chg="mod">
+          <ac:chgData name="FRANCESCO VECCHIO" userId="4db64fb8-01ef-41c5-8df1-b257e452db65" providerId="ADAL" clId="{73C28F58-6C43-4BD8-BE5B-C69D28A3600E}" dt="2023-12-21T03:33:26.702" v="4" actId="1076"/>
+          <ac:picMkLst>
+            <pc:docMk/>
+            <pc:sldMk cId="0" sldId="259"/>
+            <ac:picMk id="137" creationId="{00000000-0000-0000-0000-000000000000}"/>
+          </ac:picMkLst>
+        </pc:picChg>
+      </pc:sldChg>
+    </pc:docChg>
+  </pc:docChgLst>
+</pc:chgInfo>
 </file>
 
 <file path=ppt/notesMasters/notesMaster1.xml><?xml version="1.0" encoding="utf-8"?>
@@ -22031,6 +22075,34 @@
           <a:chExt cx="0" cy="0"/>
         </a:xfrm>
       </p:grpSpPr>
+      <p:pic>
+        <p:nvPicPr>
+          <p:cNvPr id="124" name="Google Shape;124;p21"/>
+          <p:cNvPicPr preferRelativeResize="0"/>
+          <p:nvPr/>
+        </p:nvPicPr>
+        <p:blipFill>
+          <a:blip r:embed="rId3">
+            <a:alphaModFix/>
+          </a:blip>
+          <a:stretch>
+            <a:fillRect/>
+          </a:stretch>
+        </p:blipFill>
+        <p:spPr>
+          <a:xfrm>
+            <a:off x="930323" y="744236"/>
+            <a:ext cx="6394727" cy="3265248"/>
+          </a:xfrm>
+          <a:prstGeom prst="rect">
+            <a:avLst/>
+          </a:prstGeom>
+          <a:noFill/>
+          <a:ln>
+            <a:noFill/>
+          </a:ln>
+        </p:spPr>
+      </p:pic>
       <p:sp>
         <p:nvSpPr>
           <p:cNvPr id="122" name="Google Shape;122;p21"/>
@@ -22154,34 +22226,6 @@
           </a:p>
         </p:txBody>
       </p:sp>
-      <p:pic>
-        <p:nvPicPr>
-          <p:cNvPr id="124" name="Google Shape;124;p21"/>
-          <p:cNvPicPr preferRelativeResize="0"/>
-          <p:nvPr/>
-        </p:nvPicPr>
-        <p:blipFill>
-          <a:blip r:embed="rId3">
-            <a:alphaModFix/>
-          </a:blip>
-          <a:stretch>
-            <a:fillRect/>
-          </a:stretch>
-        </p:blipFill>
-        <p:spPr>
-          <a:xfrm>
-            <a:off x="1374625" y="558691"/>
-            <a:ext cx="6394727" cy="3265248"/>
-          </a:xfrm>
-          <a:prstGeom prst="rect">
-            <a:avLst/>
-          </a:prstGeom>
-          <a:noFill/>
-          <a:ln>
-            <a:noFill/>
-          </a:ln>
-        </p:spPr>
-      </p:pic>
       <p:sp>
         <p:nvSpPr>
           <p:cNvPr id="125" name="Google Shape;125;p21"/>
@@ -22635,7 +22679,7 @@
         </p:blipFill>
         <p:spPr>
           <a:xfrm>
-            <a:off x="1471062" y="434950"/>
+            <a:off x="1514224" y="638797"/>
             <a:ext cx="6115551" cy="3410100"/>
           </a:xfrm>
           <a:prstGeom prst="rect">

</xml_diff>